<commit_message>
Fixed materials for lesson 1
</commit_message>
<xml_diff>
--- a/Lezione 1.B - Tecnologie.pptx
+++ b/Lezione 1.B - Tecnologie.pptx
@@ -9,6 +9,7 @@
     <p:sldId id="260" r:id="rId3"/>
     <p:sldId id="261" r:id="rId4"/>
     <p:sldId id="262" r:id="rId5"/>
+    <p:sldId id="263" r:id="rId6"/>
   </p:sldIdLst>
   <p:sldSz cx="12192000" cy="6858000"/>
   <p:notesSz cx="6858000" cy="9144000"/>
@@ -115,6 +116,14 @@
 </p:presentation>
 </file>
 
+<file path=ppt/revisionInfo.xml><?xml version="1.0" encoding="utf-8"?>
+<p1510:revInfo xmlns:a="http://schemas.openxmlformats.org/drawingml/2006/main" xmlns:r="http://schemas.openxmlformats.org/officeDocument/2006/relationships" xmlns:p1510="http://schemas.microsoft.com/office/powerpoint/2015/10/main">
+  <p1510:revLst>
+    <p1510:client id="{94C3CB83-F1C9-DE47-B110-764A00B4E14A}" v="20" dt="2020-03-28T07:10:48.930"/>
+  </p1510:revLst>
+</p1510:revInfo>
+</file>
+
 <file path=ppt/changesInfos/changesInfo1.xml><?xml version="1.0" encoding="utf-8"?>
 <pc:chgInfo xmlns:a="http://schemas.openxmlformats.org/drawingml/2006/main" xmlns:r="http://schemas.openxmlformats.org/officeDocument/2006/relationships" xmlns:ac="http://schemas.microsoft.com/office/drawing/2013/main/command" xmlns:pc="http://schemas.microsoft.com/office/powerpoint/2013/main/command">
   <pc:docChgLst>
@@ -143,8 +152,8 @@
   </pc:docChgLst>
   <pc:docChgLst>
     <pc:chgData name="Andrea Biancini" userId="39b537c89ae349f9" providerId="LiveId" clId="{94C3CB83-F1C9-DE47-B110-764A00B4E14A}"/>
-    <pc:docChg chg="delSld">
-      <pc:chgData name="Andrea Biancini" userId="39b537c89ae349f9" providerId="LiveId" clId="{94C3CB83-F1C9-DE47-B110-764A00B4E14A}" dt="2020-03-24T19:24:06.530" v="2" actId="2696"/>
+    <pc:docChg chg="undo custSel mod addSld delSld modSld">
+      <pc:chgData name="Andrea Biancini" userId="39b537c89ae349f9" providerId="LiveId" clId="{94C3CB83-F1C9-DE47-B110-764A00B4E14A}" dt="2020-03-28T07:12:26.630" v="160" actId="20577"/>
       <pc:docMkLst>
         <pc:docMk/>
       </pc:docMkLst>
@@ -168,6 +177,426 @@
           <pc:docMk/>
           <pc:sldMk cId="801120856" sldId="259"/>
         </pc:sldMkLst>
+      </pc:sldChg>
+      <pc:sldChg chg="addSp delSp delDesignElem">
+        <pc:chgData name="Andrea Biancini" userId="39b537c89ae349f9" providerId="LiveId" clId="{94C3CB83-F1C9-DE47-B110-764A00B4E14A}" dt="2020-03-28T07:10:48.930" v="136"/>
+        <pc:sldMkLst>
+          <pc:docMk/>
+          <pc:sldMk cId="768410509" sldId="260"/>
+        </pc:sldMkLst>
+        <pc:spChg chg="add del">
+          <ac:chgData name="Andrea Biancini" userId="39b537c89ae349f9" providerId="LiveId" clId="{94C3CB83-F1C9-DE47-B110-764A00B4E14A}" dt="2020-03-28T07:10:48.930" v="136"/>
+          <ac:spMkLst>
+            <pc:docMk/>
+            <pc:sldMk cId="768410509" sldId="260"/>
+            <ac:spMk id="11" creationId="{8D70B121-56F4-4848-B38B-182089D909FA}"/>
+          </ac:spMkLst>
+        </pc:spChg>
+        <pc:cxnChg chg="add del">
+          <ac:chgData name="Andrea Biancini" userId="39b537c89ae349f9" providerId="LiveId" clId="{94C3CB83-F1C9-DE47-B110-764A00B4E14A}" dt="2020-03-28T07:10:48.930" v="136"/>
+          <ac:cxnSpMkLst>
+            <pc:docMk/>
+            <pc:sldMk cId="768410509" sldId="260"/>
+            <ac:cxnSpMk id="12" creationId="{2D72A2C9-F3CA-4216-8BAD-FA4C970C3C4E}"/>
+          </ac:cxnSpMkLst>
+        </pc:cxnChg>
+      </pc:sldChg>
+      <pc:sldChg chg="addSp delSp delDesignElem">
+        <pc:chgData name="Andrea Biancini" userId="39b537c89ae349f9" providerId="LiveId" clId="{94C3CB83-F1C9-DE47-B110-764A00B4E14A}" dt="2020-03-28T07:10:48.930" v="136"/>
+        <pc:sldMkLst>
+          <pc:docMk/>
+          <pc:sldMk cId="3965161745" sldId="261"/>
+        </pc:sldMkLst>
+        <pc:spChg chg="add del">
+          <ac:chgData name="Andrea Biancini" userId="39b537c89ae349f9" providerId="LiveId" clId="{94C3CB83-F1C9-DE47-B110-764A00B4E14A}" dt="2020-03-28T07:10:48.930" v="136"/>
+          <ac:spMkLst>
+            <pc:docMk/>
+            <pc:sldMk cId="3965161745" sldId="261"/>
+            <ac:spMk id="17" creationId="{A4AC5506-6312-4701-8D3C-40187889A947}"/>
+          </ac:spMkLst>
+        </pc:spChg>
+      </pc:sldChg>
+      <pc:sldChg chg="addSp delSp delDesignElem">
+        <pc:chgData name="Andrea Biancini" userId="39b537c89ae349f9" providerId="LiveId" clId="{94C3CB83-F1C9-DE47-B110-764A00B4E14A}" dt="2020-03-28T07:10:48.930" v="136"/>
+        <pc:sldMkLst>
+          <pc:docMk/>
+          <pc:sldMk cId="3466574611" sldId="262"/>
+        </pc:sldMkLst>
+        <pc:spChg chg="add del">
+          <ac:chgData name="Andrea Biancini" userId="39b537c89ae349f9" providerId="LiveId" clId="{94C3CB83-F1C9-DE47-B110-764A00B4E14A}" dt="2020-03-28T07:10:48.930" v="136"/>
+          <ac:spMkLst>
+            <pc:docMk/>
+            <pc:sldMk cId="3466574611" sldId="262"/>
+            <ac:spMk id="24" creationId="{87CC2527-562A-4F69-B487-4371E5B243E7}"/>
+          </ac:spMkLst>
+        </pc:spChg>
+        <pc:cxnChg chg="add del">
+          <ac:chgData name="Andrea Biancini" userId="39b537c89ae349f9" providerId="LiveId" clId="{94C3CB83-F1C9-DE47-B110-764A00B4E14A}" dt="2020-03-28T07:10:48.930" v="136"/>
+          <ac:cxnSpMkLst>
+            <pc:docMk/>
+            <pc:sldMk cId="3466574611" sldId="262"/>
+            <ac:cxnSpMk id="25" creationId="{BCDAEC91-5BCE-4B55-9CC0-43EF94CB734B}"/>
+          </ac:cxnSpMkLst>
+        </pc:cxnChg>
+      </pc:sldChg>
+      <pc:sldChg chg="addSp delSp modSp add mod setBg delDesignElem">
+        <pc:chgData name="Andrea Biancini" userId="39b537c89ae349f9" providerId="LiveId" clId="{94C3CB83-F1C9-DE47-B110-764A00B4E14A}" dt="2020-03-28T07:12:26.630" v="160" actId="20577"/>
+        <pc:sldMkLst>
+          <pc:docMk/>
+          <pc:sldMk cId="1300163380" sldId="263"/>
+        </pc:sldMkLst>
+        <pc:spChg chg="add mod">
+          <ac:chgData name="Andrea Biancini" userId="39b537c89ae349f9" providerId="LiveId" clId="{94C3CB83-F1C9-DE47-B110-764A00B4E14A}" dt="2020-03-28T07:12:26.630" v="160" actId="20577"/>
+          <ac:spMkLst>
+            <pc:docMk/>
+            <pc:sldMk cId="1300163380" sldId="263"/>
+            <ac:spMk id="4" creationId="{4D4B8C53-9907-9F44-8B18-02C2B7463E55}"/>
+          </ac:spMkLst>
+        </pc:spChg>
+        <pc:spChg chg="add del mod">
+          <ac:chgData name="Andrea Biancini" userId="39b537c89ae349f9" providerId="LiveId" clId="{94C3CB83-F1C9-DE47-B110-764A00B4E14A}" dt="2020-03-28T07:08:05.146" v="120" actId="478"/>
+          <ac:spMkLst>
+            <pc:docMk/>
+            <pc:sldMk cId="1300163380" sldId="263"/>
+            <ac:spMk id="6" creationId="{95E70535-01BA-B34F-9C4B-7E2BB6D737CB}"/>
+          </ac:spMkLst>
+        </pc:spChg>
+        <pc:spChg chg="del">
+          <ac:chgData name="Andrea Biancini" userId="39b537c89ae349f9" providerId="LiveId" clId="{94C3CB83-F1C9-DE47-B110-764A00B4E14A}" dt="2020-03-28T07:05:44.547" v="7" actId="478"/>
+          <ac:spMkLst>
+            <pc:docMk/>
+            <pc:sldMk cId="1300163380" sldId="263"/>
+            <ac:spMk id="8" creationId="{DB74288D-56A7-4E0A-8518-7269F47C7A99}"/>
+          </ac:spMkLst>
+        </pc:spChg>
+        <pc:spChg chg="add mod">
+          <ac:chgData name="Andrea Biancini" userId="39b537c89ae349f9" providerId="LiveId" clId="{94C3CB83-F1C9-DE47-B110-764A00B4E14A}" dt="2020-03-28T07:12:07.439" v="159" actId="255"/>
+          <ac:spMkLst>
+            <pc:docMk/>
+            <pc:sldMk cId="1300163380" sldId="263"/>
+            <ac:spMk id="9" creationId="{AFFBDDBD-B8E5-E340-8E62-B8814E2EDCCC}"/>
+          </ac:spMkLst>
+        </pc:spChg>
+        <pc:spChg chg="add del">
+          <ac:chgData name="Andrea Biancini" userId="39b537c89ae349f9" providerId="LiveId" clId="{94C3CB83-F1C9-DE47-B110-764A00B4E14A}" dt="2020-03-28T07:06:17.323" v="11" actId="26606"/>
+          <ac:spMkLst>
+            <pc:docMk/>
+            <pc:sldMk cId="1300163380" sldId="263"/>
+            <ac:spMk id="14" creationId="{3B854194-185D-494D-905C-7C7CB2E30F6E}"/>
+          </ac:spMkLst>
+        </pc:spChg>
+        <pc:spChg chg="add del">
+          <ac:chgData name="Andrea Biancini" userId="39b537c89ae349f9" providerId="LiveId" clId="{94C3CB83-F1C9-DE47-B110-764A00B4E14A}" dt="2020-03-28T07:06:21.982" v="15" actId="26606"/>
+          <ac:spMkLst>
+            <pc:docMk/>
+            <pc:sldMk cId="1300163380" sldId="263"/>
+            <ac:spMk id="15" creationId="{3BA513B0-82FF-4F41-8178-885375D1CFB5}"/>
+          </ac:spMkLst>
+        </pc:spChg>
+        <pc:spChg chg="add del">
+          <ac:chgData name="Andrea Biancini" userId="39b537c89ae349f9" providerId="LiveId" clId="{94C3CB83-F1C9-DE47-B110-764A00B4E14A}" dt="2020-03-28T07:06:17.323" v="11" actId="26606"/>
+          <ac:spMkLst>
+            <pc:docMk/>
+            <pc:sldMk cId="1300163380" sldId="263"/>
+            <ac:spMk id="16" creationId="{B4F5FA0D-0104-4987-8241-EFF7C85B88DE}"/>
+          </ac:spMkLst>
+        </pc:spChg>
+        <pc:spChg chg="add del">
+          <ac:chgData name="Andrea Biancini" userId="39b537c89ae349f9" providerId="LiveId" clId="{94C3CB83-F1C9-DE47-B110-764A00B4E14A}" dt="2020-03-28T07:06:20.835" v="13" actId="26606"/>
+          <ac:spMkLst>
+            <pc:docMk/>
+            <pc:sldMk cId="1300163380" sldId="263"/>
+            <ac:spMk id="20" creationId="{59A309A7-1751-4ABE-A3C1-EEC40366AD89}"/>
+          </ac:spMkLst>
+        </pc:spChg>
+        <pc:spChg chg="add del">
+          <ac:chgData name="Andrea Biancini" userId="39b537c89ae349f9" providerId="LiveId" clId="{94C3CB83-F1C9-DE47-B110-764A00B4E14A}" dt="2020-03-28T07:06:20.835" v="13" actId="26606"/>
+          <ac:spMkLst>
+            <pc:docMk/>
+            <pc:sldMk cId="1300163380" sldId="263"/>
+            <ac:spMk id="21" creationId="{967D8EB6-EAE1-4F9C-B398-83321E287204}"/>
+          </ac:spMkLst>
+        </pc:spChg>
+        <pc:spChg chg="add del">
+          <ac:chgData name="Andrea Biancini" userId="39b537c89ae349f9" providerId="LiveId" clId="{94C3CB83-F1C9-DE47-B110-764A00B4E14A}" dt="2020-03-28T07:06:29.101" v="23" actId="26606"/>
+          <ac:spMkLst>
+            <pc:docMk/>
+            <pc:sldMk cId="1300163380" sldId="263"/>
+            <ac:spMk id="22" creationId="{83BA5EF5-1FE9-4BF9-83BB-269BCDDF6156}"/>
+          </ac:spMkLst>
+        </pc:spChg>
+        <pc:spChg chg="del">
+          <ac:chgData name="Andrea Biancini" userId="39b537c89ae349f9" providerId="LiveId" clId="{94C3CB83-F1C9-DE47-B110-764A00B4E14A}" dt="2020-03-28T07:05:40.708" v="4"/>
+          <ac:spMkLst>
+            <pc:docMk/>
+            <pc:sldMk cId="1300163380" sldId="263"/>
+            <ac:spMk id="24" creationId="{87CC2527-562A-4F69-B487-4371E5B243E7}"/>
+          </ac:spMkLst>
+        </pc:spChg>
+        <pc:spChg chg="add del">
+          <ac:chgData name="Andrea Biancini" userId="39b537c89ae349f9" providerId="LiveId" clId="{94C3CB83-F1C9-DE47-B110-764A00B4E14A}" dt="2020-03-28T07:06:29.101" v="23" actId="26606"/>
+          <ac:spMkLst>
+            <pc:docMk/>
+            <pc:sldMk cId="1300163380" sldId="263"/>
+            <ac:spMk id="26" creationId="{88853921-7BC9-4BDE-ACAB-133C683C82D6}"/>
+          </ac:spMkLst>
+        </pc:spChg>
+        <pc:spChg chg="add del">
+          <ac:chgData name="Andrea Biancini" userId="39b537c89ae349f9" providerId="LiveId" clId="{94C3CB83-F1C9-DE47-B110-764A00B4E14A}" dt="2020-03-28T07:06:29.101" v="23" actId="26606"/>
+          <ac:spMkLst>
+            <pc:docMk/>
+            <pc:sldMk cId="1300163380" sldId="263"/>
+            <ac:spMk id="28" creationId="{09192968-3AE7-4470-A61C-97294BB92731}"/>
+          </ac:spMkLst>
+        </pc:spChg>
+        <pc:spChg chg="add del">
+          <ac:chgData name="Andrea Biancini" userId="39b537c89ae349f9" providerId="LiveId" clId="{94C3CB83-F1C9-DE47-B110-764A00B4E14A}" dt="2020-03-28T07:06:22.838" v="17" actId="26606"/>
+          <ac:spMkLst>
+            <pc:docMk/>
+            <pc:sldMk cId="1300163380" sldId="263"/>
+            <ac:spMk id="29" creationId="{8D70B121-56F4-4848-B38B-182089D909FA}"/>
+          </ac:spMkLst>
+        </pc:spChg>
+        <pc:spChg chg="add del">
+          <ac:chgData name="Andrea Biancini" userId="39b537c89ae349f9" providerId="LiveId" clId="{94C3CB83-F1C9-DE47-B110-764A00B4E14A}" dt="2020-03-28T07:06:24.418" v="19" actId="26606"/>
+          <ac:spMkLst>
+            <pc:docMk/>
+            <pc:sldMk cId="1300163380" sldId="263"/>
+            <ac:spMk id="32" creationId="{59A309A7-1751-4ABE-A3C1-EEC40366AD89}"/>
+          </ac:spMkLst>
+        </pc:spChg>
+        <pc:spChg chg="add del">
+          <ac:chgData name="Andrea Biancini" userId="39b537c89ae349f9" providerId="LiveId" clId="{94C3CB83-F1C9-DE47-B110-764A00B4E14A}" dt="2020-03-28T07:06:24.418" v="19" actId="26606"/>
+          <ac:spMkLst>
+            <pc:docMk/>
+            <pc:sldMk cId="1300163380" sldId="263"/>
+            <ac:spMk id="33" creationId="{967D8EB6-EAE1-4F9C-B398-83321E287204}"/>
+          </ac:spMkLst>
+        </pc:spChg>
+        <pc:spChg chg="add del">
+          <ac:chgData name="Andrea Biancini" userId="39b537c89ae349f9" providerId="LiveId" clId="{94C3CB83-F1C9-DE47-B110-764A00B4E14A}" dt="2020-03-28T07:06:26.768" v="21" actId="26606"/>
+          <ac:spMkLst>
+            <pc:docMk/>
+            <pc:sldMk cId="1300163380" sldId="263"/>
+            <ac:spMk id="36" creationId="{59A309A7-1751-4ABE-A3C1-EEC40366AD89}"/>
+          </ac:spMkLst>
+        </pc:spChg>
+        <pc:spChg chg="add del">
+          <ac:chgData name="Andrea Biancini" userId="39b537c89ae349f9" providerId="LiveId" clId="{94C3CB83-F1C9-DE47-B110-764A00B4E14A}" dt="2020-03-28T07:06:26.768" v="21" actId="26606"/>
+          <ac:spMkLst>
+            <pc:docMk/>
+            <pc:sldMk cId="1300163380" sldId="263"/>
+            <ac:spMk id="37" creationId="{967D8EB6-EAE1-4F9C-B398-83321E287204}"/>
+          </ac:spMkLst>
+        </pc:spChg>
+        <pc:spChg chg="add del">
+          <ac:chgData name="Andrea Biancini" userId="39b537c89ae349f9" providerId="LiveId" clId="{94C3CB83-F1C9-DE47-B110-764A00B4E14A}" dt="2020-03-28T07:06:29.101" v="23" actId="26606"/>
+          <ac:spMkLst>
+            <pc:docMk/>
+            <pc:sldMk cId="1300163380" sldId="263"/>
+            <ac:spMk id="40" creationId="{F837543A-6020-4505-A233-C9DB4BF74011}"/>
+          </ac:spMkLst>
+        </pc:spChg>
+        <pc:spChg chg="add del">
+          <ac:chgData name="Andrea Biancini" userId="39b537c89ae349f9" providerId="LiveId" clId="{94C3CB83-F1C9-DE47-B110-764A00B4E14A}" dt="2020-03-28T07:06:29.101" v="23" actId="26606"/>
+          <ac:spMkLst>
+            <pc:docMk/>
+            <pc:sldMk cId="1300163380" sldId="263"/>
+            <ac:spMk id="41" creationId="{35B16301-FB18-48BA-A6DD-C37CAF6F9A18}"/>
+          </ac:spMkLst>
+        </pc:spChg>
+        <pc:spChg chg="add del">
+          <ac:chgData name="Andrea Biancini" userId="39b537c89ae349f9" providerId="LiveId" clId="{94C3CB83-F1C9-DE47-B110-764A00B4E14A}" dt="2020-03-28T07:06:29.101" v="23" actId="26606"/>
+          <ac:spMkLst>
+            <pc:docMk/>
+            <pc:sldMk cId="1300163380" sldId="263"/>
+            <ac:spMk id="42" creationId="{C3C0D90E-074A-4F52-9B11-B52BEF4BCBE5}"/>
+          </ac:spMkLst>
+        </pc:spChg>
+        <pc:spChg chg="add del">
+          <ac:chgData name="Andrea Biancini" userId="39b537c89ae349f9" providerId="LiveId" clId="{94C3CB83-F1C9-DE47-B110-764A00B4E14A}" dt="2020-03-28T07:06:29.101" v="23" actId="26606"/>
+          <ac:spMkLst>
+            <pc:docMk/>
+            <pc:sldMk cId="1300163380" sldId="263"/>
+            <ac:spMk id="43" creationId="{CABBD4C1-E6F8-46F6-8152-A8A97490BF4D}"/>
+          </ac:spMkLst>
+        </pc:spChg>
+        <pc:spChg chg="add del">
+          <ac:chgData name="Andrea Biancini" userId="39b537c89ae349f9" providerId="LiveId" clId="{94C3CB83-F1C9-DE47-B110-764A00B4E14A}" dt="2020-03-28T07:06:29.101" v="23" actId="26606"/>
+          <ac:spMkLst>
+            <pc:docMk/>
+            <pc:sldMk cId="1300163380" sldId="263"/>
+            <ac:spMk id="45" creationId="{3AB72E55-43E4-4356-BFE8-E2102CB0B505}"/>
+          </ac:spMkLst>
+        </pc:spChg>
+        <pc:spChg chg="add del">
+          <ac:chgData name="Andrea Biancini" userId="39b537c89ae349f9" providerId="LiveId" clId="{94C3CB83-F1C9-DE47-B110-764A00B4E14A}" dt="2020-03-28T07:06:33.851" v="25" actId="26606"/>
+          <ac:spMkLst>
+            <pc:docMk/>
+            <pc:sldMk cId="1300163380" sldId="263"/>
+            <ac:spMk id="47" creationId="{1C799903-48D5-4A31-A1A2-541072D9771E}"/>
+          </ac:spMkLst>
+        </pc:spChg>
+        <pc:spChg chg="add del">
+          <ac:chgData name="Andrea Biancini" userId="39b537c89ae349f9" providerId="LiveId" clId="{94C3CB83-F1C9-DE47-B110-764A00B4E14A}" dt="2020-03-28T07:06:33.851" v="25" actId="26606"/>
+          <ac:spMkLst>
+            <pc:docMk/>
+            <pc:sldMk cId="1300163380" sldId="263"/>
+            <ac:spMk id="48" creationId="{8EFFF109-FC58-4FD3-BE05-9775A1310F55}"/>
+          </ac:spMkLst>
+        </pc:spChg>
+        <pc:spChg chg="add del">
+          <ac:chgData name="Andrea Biancini" userId="39b537c89ae349f9" providerId="LiveId" clId="{94C3CB83-F1C9-DE47-B110-764A00B4E14A}" dt="2020-03-28T07:06:33.851" v="25" actId="26606"/>
+          <ac:spMkLst>
+            <pc:docMk/>
+            <pc:sldMk cId="1300163380" sldId="263"/>
+            <ac:spMk id="49" creationId="{E1B96AD6-92A9-4273-A62B-96A1C3E0BA95}"/>
+          </ac:spMkLst>
+        </pc:spChg>
+        <pc:spChg chg="add del">
+          <ac:chgData name="Andrea Biancini" userId="39b537c89ae349f9" providerId="LiveId" clId="{94C3CB83-F1C9-DE47-B110-764A00B4E14A}" dt="2020-03-28T07:06:33.851" v="25" actId="26606"/>
+          <ac:spMkLst>
+            <pc:docMk/>
+            <pc:sldMk cId="1300163380" sldId="263"/>
+            <ac:spMk id="50" creationId="{463EEC44-1BA3-44ED-81FC-A644B04B2A44}"/>
+          </ac:spMkLst>
+        </pc:spChg>
+        <pc:spChg chg="add del">
+          <ac:chgData name="Andrea Biancini" userId="39b537c89ae349f9" providerId="LiveId" clId="{94C3CB83-F1C9-DE47-B110-764A00B4E14A}" dt="2020-03-28T07:10:58.935" v="137" actId="26606"/>
+          <ac:spMkLst>
+            <pc:docMk/>
+            <pc:sldMk cId="1300163380" sldId="263"/>
+            <ac:spMk id="52" creationId="{59A309A7-1751-4ABE-A3C1-EEC40366AD89}"/>
+          </ac:spMkLst>
+        </pc:spChg>
+        <pc:spChg chg="add del">
+          <ac:chgData name="Andrea Biancini" userId="39b537c89ae349f9" providerId="LiveId" clId="{94C3CB83-F1C9-DE47-B110-764A00B4E14A}" dt="2020-03-28T07:10:58.935" v="137" actId="26606"/>
+          <ac:spMkLst>
+            <pc:docMk/>
+            <pc:sldMk cId="1300163380" sldId="263"/>
+            <ac:spMk id="53" creationId="{967D8EB6-EAE1-4F9C-B398-83321E287204}"/>
+          </ac:spMkLst>
+        </pc:spChg>
+        <pc:spChg chg="add">
+          <ac:chgData name="Andrea Biancini" userId="39b537c89ae349f9" providerId="LiveId" clId="{94C3CB83-F1C9-DE47-B110-764A00B4E14A}" dt="2020-03-28T07:10:58.935" v="137" actId="26606"/>
+          <ac:spMkLst>
+            <pc:docMk/>
+            <pc:sldMk cId="1300163380" sldId="263"/>
+            <ac:spMk id="58" creationId="{74426AB7-D619-4515-962A-BC83909EC015}"/>
+          </ac:spMkLst>
+        </pc:spChg>
+        <pc:spChg chg="add">
+          <ac:chgData name="Andrea Biancini" userId="39b537c89ae349f9" providerId="LiveId" clId="{94C3CB83-F1C9-DE47-B110-764A00B4E14A}" dt="2020-03-28T07:10:58.935" v="137" actId="26606"/>
+          <ac:spMkLst>
+            <pc:docMk/>
+            <pc:sldMk cId="1300163380" sldId="263"/>
+            <ac:spMk id="60" creationId="{DE47DF98-723F-4AAC-ABCF-CACBC438F78F}"/>
+          </ac:spMkLst>
+        </pc:spChg>
+        <pc:grpChg chg="add del">
+          <ac:chgData name="Andrea Biancini" userId="39b537c89ae349f9" providerId="LiveId" clId="{94C3CB83-F1C9-DE47-B110-764A00B4E14A}" dt="2020-03-28T07:06:21.982" v="15" actId="26606"/>
+          <ac:grpSpMkLst>
+            <pc:docMk/>
+            <pc:sldMk cId="1300163380" sldId="263"/>
+            <ac:grpSpMk id="17" creationId="{93DB8501-F9F2-4ACD-B56A-9019CD5006D6}"/>
+          </ac:grpSpMkLst>
+        </pc:grpChg>
+        <pc:picChg chg="del mod">
+          <ac:chgData name="Andrea Biancini" userId="39b537c89ae349f9" providerId="LiveId" clId="{94C3CB83-F1C9-DE47-B110-764A00B4E14A}" dt="2020-03-28T07:05:42.208" v="6" actId="478"/>
+          <ac:picMkLst>
+            <pc:docMk/>
+            <pc:sldMk cId="1300163380" sldId="263"/>
+            <ac:picMk id="2" creationId="{0E8908C2-BDB0-432F-BED2-F52E8ABCB6E1}"/>
+          </ac:picMkLst>
+        </pc:picChg>
+        <pc:picChg chg="add mod modCrop">
+          <ac:chgData name="Andrea Biancini" userId="39b537c89ae349f9" providerId="LiveId" clId="{94C3CB83-F1C9-DE47-B110-764A00B4E14A}" dt="2020-03-28T07:10:58.935" v="137" actId="26606"/>
+          <ac:picMkLst>
+            <pc:docMk/>
+            <pc:sldMk cId="1300163380" sldId="263"/>
+            <ac:picMk id="5" creationId="{60114E3F-A640-2449-824C-D5F123564BFF}"/>
+          </ac:picMkLst>
+        </pc:picChg>
+        <pc:picChg chg="add del">
+          <ac:chgData name="Andrea Biancini" userId="39b537c89ae349f9" providerId="LiveId" clId="{94C3CB83-F1C9-DE47-B110-764A00B4E14A}" dt="2020-03-28T07:06:21.982" v="15" actId="26606"/>
+          <ac:picMkLst>
+            <pc:docMk/>
+            <pc:sldMk cId="1300163380" sldId="263"/>
+            <ac:picMk id="11" creationId="{C18EFB64-203C-4DDF-A8E3-23EF120B97F2}"/>
+          </ac:picMkLst>
+        </pc:picChg>
+        <pc:picChg chg="add del">
+          <ac:chgData name="Andrea Biancini" userId="39b537c89ae349f9" providerId="LiveId" clId="{94C3CB83-F1C9-DE47-B110-764A00B4E14A}" dt="2020-03-28T07:06:20.835" v="13" actId="26606"/>
+          <ac:picMkLst>
+            <pc:docMk/>
+            <pc:sldMk cId="1300163380" sldId="263"/>
+            <ac:picMk id="13" creationId="{DAE977A0-F500-4C79-AADA-DF12B0ADA876}"/>
+          </ac:picMkLst>
+        </pc:picChg>
+        <pc:picChg chg="add del">
+          <ac:chgData name="Andrea Biancini" userId="39b537c89ae349f9" providerId="LiveId" clId="{94C3CB83-F1C9-DE47-B110-764A00B4E14A}" dt="2020-03-28T07:06:17.323" v="11" actId="26606"/>
+          <ac:picMkLst>
+            <pc:docMk/>
+            <pc:sldMk cId="1300163380" sldId="263"/>
+            <ac:picMk id="18" creationId="{2897127E-6CEF-446C-BE87-93B7C46E49D1}"/>
+          </ac:picMkLst>
+        </pc:picChg>
+        <pc:picChg chg="add del">
+          <ac:chgData name="Andrea Biancini" userId="39b537c89ae349f9" providerId="LiveId" clId="{94C3CB83-F1C9-DE47-B110-764A00B4E14A}" dt="2020-03-28T07:06:24.418" v="19" actId="26606"/>
+          <ac:picMkLst>
+            <pc:docMk/>
+            <pc:sldMk cId="1300163380" sldId="263"/>
+            <ac:picMk id="34" creationId="{DAE977A0-F500-4C79-AADA-DF12B0ADA876}"/>
+          </ac:picMkLst>
+        </pc:picChg>
+        <pc:picChg chg="add del">
+          <ac:chgData name="Andrea Biancini" userId="39b537c89ae349f9" providerId="LiveId" clId="{94C3CB83-F1C9-DE47-B110-764A00B4E14A}" dt="2020-03-28T07:06:26.768" v="21" actId="26606"/>
+          <ac:picMkLst>
+            <pc:docMk/>
+            <pc:sldMk cId="1300163380" sldId="263"/>
+            <ac:picMk id="38" creationId="{6A5846E9-1081-4ABA-A247-E09ECB13418C}"/>
+          </ac:picMkLst>
+        </pc:picChg>
+        <pc:picChg chg="add del">
+          <ac:chgData name="Andrea Biancini" userId="39b537c89ae349f9" providerId="LiveId" clId="{94C3CB83-F1C9-DE47-B110-764A00B4E14A}" dt="2020-03-28T07:07:31.855" v="114" actId="478"/>
+          <ac:picMkLst>
+            <pc:docMk/>
+            <pc:sldMk cId="1300163380" sldId="263"/>
+            <ac:picMk id="54" creationId="{DAE977A0-F500-4C79-AADA-DF12B0ADA876}"/>
+          </ac:picMkLst>
+        </pc:picChg>
+        <pc:cxnChg chg="del">
+          <ac:chgData name="Andrea Biancini" userId="39b537c89ae349f9" providerId="LiveId" clId="{94C3CB83-F1C9-DE47-B110-764A00B4E14A}" dt="2020-03-28T07:05:40.708" v="4"/>
+          <ac:cxnSpMkLst>
+            <pc:docMk/>
+            <pc:sldMk cId="1300163380" sldId="263"/>
+            <ac:cxnSpMk id="25" creationId="{BCDAEC91-5BCE-4B55-9CC0-43EF94CB734B}"/>
+          </ac:cxnSpMkLst>
+        </pc:cxnChg>
+        <pc:cxnChg chg="add del">
+          <ac:chgData name="Andrea Biancini" userId="39b537c89ae349f9" providerId="LiveId" clId="{94C3CB83-F1C9-DE47-B110-764A00B4E14A}" dt="2020-03-28T07:06:22.838" v="17" actId="26606"/>
+          <ac:cxnSpMkLst>
+            <pc:docMk/>
+            <pc:sldMk cId="1300163380" sldId="263"/>
+            <ac:cxnSpMk id="30" creationId="{2D72A2C9-F3CA-4216-8BAD-FA4C970C3C4E}"/>
+          </ac:cxnSpMkLst>
+        </pc:cxnChg>
+        <pc:cxnChg chg="add del">
+          <ac:chgData name="Andrea Biancini" userId="39b537c89ae349f9" providerId="LiveId" clId="{94C3CB83-F1C9-DE47-B110-764A00B4E14A}" dt="2020-03-28T07:06:29.101" v="23" actId="26606"/>
+          <ac:cxnSpMkLst>
+            <pc:docMk/>
+            <pc:sldMk cId="1300163380" sldId="263"/>
+            <ac:cxnSpMk id="44" creationId="{4B3BCACB-5880-460B-9606-8C433A9AF99D}"/>
+          </ac:cxnSpMkLst>
+        </pc:cxnChg>
+        <pc:cxnChg chg="add">
+          <ac:chgData name="Andrea Biancini" userId="39b537c89ae349f9" providerId="LiveId" clId="{94C3CB83-F1C9-DE47-B110-764A00B4E14A}" dt="2020-03-28T07:10:58.935" v="137" actId="26606"/>
+          <ac:cxnSpMkLst>
+            <pc:docMk/>
+            <pc:sldMk cId="1300163380" sldId="263"/>
+            <ac:cxnSpMk id="62" creationId="{EA29FC7C-9308-4FDE-8DCA-405668055B0F}"/>
+          </ac:cxnSpMkLst>
+        </pc:cxnChg>
       </pc:sldChg>
     </pc:docChg>
   </pc:docChgLst>
@@ -707,7 +1136,7 @@
           <a:p>
             <a:fld id="{EF8CF7BB-B63C-407D-86CA-84C3FEF14ADC}" type="datetimeFigureOut">
               <a:rPr lang="it-IT" smtClean="0"/>
-              <a:t>24/03/20</a:t>
+              <a:t>28/03/20</a:t>
             </a:fld>
             <a:endParaRPr lang="it-IT"/>
           </a:p>
@@ -905,7 +1334,7 @@
           <a:p>
             <a:fld id="{EF8CF7BB-B63C-407D-86CA-84C3FEF14ADC}" type="datetimeFigureOut">
               <a:rPr lang="it-IT" smtClean="0"/>
-              <a:t>24/03/20</a:t>
+              <a:t>28/03/20</a:t>
             </a:fld>
             <a:endParaRPr lang="it-IT"/>
           </a:p>
@@ -1113,7 +1542,7 @@
           <a:p>
             <a:fld id="{EF8CF7BB-B63C-407D-86CA-84C3FEF14ADC}" type="datetimeFigureOut">
               <a:rPr lang="it-IT" smtClean="0"/>
-              <a:t>24/03/20</a:t>
+              <a:t>28/03/20</a:t>
             </a:fld>
             <a:endParaRPr lang="it-IT"/>
           </a:p>
@@ -1311,7 +1740,7 @@
           <a:p>
             <a:fld id="{EF8CF7BB-B63C-407D-86CA-84C3FEF14ADC}" type="datetimeFigureOut">
               <a:rPr lang="it-IT" smtClean="0"/>
-              <a:t>24/03/20</a:t>
+              <a:t>28/03/20</a:t>
             </a:fld>
             <a:endParaRPr lang="it-IT"/>
           </a:p>
@@ -1586,7 +2015,7 @@
           <a:p>
             <a:fld id="{EF8CF7BB-B63C-407D-86CA-84C3FEF14ADC}" type="datetimeFigureOut">
               <a:rPr lang="it-IT" smtClean="0"/>
-              <a:t>24/03/20</a:t>
+              <a:t>28/03/20</a:t>
             </a:fld>
             <a:endParaRPr lang="it-IT"/>
           </a:p>
@@ -1851,7 +2280,7 @@
           <a:p>
             <a:fld id="{EF8CF7BB-B63C-407D-86CA-84C3FEF14ADC}" type="datetimeFigureOut">
               <a:rPr lang="it-IT" smtClean="0"/>
-              <a:t>24/03/20</a:t>
+              <a:t>28/03/20</a:t>
             </a:fld>
             <a:endParaRPr lang="it-IT"/>
           </a:p>
@@ -2263,7 +2692,7 @@
           <a:p>
             <a:fld id="{EF8CF7BB-B63C-407D-86CA-84C3FEF14ADC}" type="datetimeFigureOut">
               <a:rPr lang="it-IT" smtClean="0"/>
-              <a:t>24/03/20</a:t>
+              <a:t>28/03/20</a:t>
             </a:fld>
             <a:endParaRPr lang="it-IT"/>
           </a:p>
@@ -2404,7 +2833,7 @@
           <a:p>
             <a:fld id="{EF8CF7BB-B63C-407D-86CA-84C3FEF14ADC}" type="datetimeFigureOut">
               <a:rPr lang="it-IT" smtClean="0"/>
-              <a:t>24/03/20</a:t>
+              <a:t>28/03/20</a:t>
             </a:fld>
             <a:endParaRPr lang="it-IT"/>
           </a:p>
@@ -2517,7 +2946,7 @@
           <a:p>
             <a:fld id="{EF8CF7BB-B63C-407D-86CA-84C3FEF14ADC}" type="datetimeFigureOut">
               <a:rPr lang="it-IT" smtClean="0"/>
-              <a:t>24/03/20</a:t>
+              <a:t>28/03/20</a:t>
             </a:fld>
             <a:endParaRPr lang="it-IT"/>
           </a:p>
@@ -2828,7 +3257,7 @@
           <a:p>
             <a:fld id="{EF8CF7BB-B63C-407D-86CA-84C3FEF14ADC}" type="datetimeFigureOut">
               <a:rPr lang="it-IT" smtClean="0"/>
-              <a:t>24/03/20</a:t>
+              <a:t>28/03/20</a:t>
             </a:fld>
             <a:endParaRPr lang="it-IT"/>
           </a:p>
@@ -3116,7 +3545,7 @@
           <a:p>
             <a:fld id="{EF8CF7BB-B63C-407D-86CA-84C3FEF14ADC}" type="datetimeFigureOut">
               <a:rPr lang="it-IT" smtClean="0"/>
-              <a:t>24/03/20</a:t>
+              <a:t>28/03/20</a:t>
             </a:fld>
             <a:endParaRPr lang="it-IT"/>
           </a:p>
@@ -3357,7 +3786,7 @@
           <a:p>
             <a:fld id="{EF8CF7BB-B63C-407D-86CA-84C3FEF14ADC}" type="datetimeFigureOut">
               <a:rPr lang="it-IT" smtClean="0"/>
-              <a:t>24/03/20</a:t>
+              <a:t>28/03/20</a:t>
             </a:fld>
             <a:endParaRPr lang="it-IT"/>
           </a:p>
@@ -4088,26 +4517,50 @@
           <a:lstStyle/>
           <a:p>
             <a:r>
-              <a:rPr lang="it-IT" sz="2400"/>
-              <a:t>Python: linguaggio di programmazione</a:t>
-            </a:r>
-          </a:p>
-          <a:p>
-            <a:r>
-              <a:rPr lang="it-IT" sz="2400"/>
-              <a:t>Pandas e Numpy: librerie per l’analisi dati e il calcolo</a:t>
-            </a:r>
-          </a:p>
-          <a:p>
-            <a:r>
-              <a:rPr lang="it-IT" sz="2400"/>
-              <a:t>Matplotlib: libreria per creare grafici</a:t>
-            </a:r>
-          </a:p>
-          <a:p>
-            <a:r>
-              <a:rPr lang="it-IT" sz="2400"/>
-              <a:t>Jupyter Notebook: strumento per «tenere tutto insieme»</a:t>
+              <a:rPr lang="it-IT" sz="2400" dirty="0" err="1"/>
+              <a:t>Python</a:t>
+            </a:r>
+            <a:r>
+              <a:rPr lang="it-IT" sz="2400" dirty="0"/>
+              <a:t>: linguaggio di programmazione</a:t>
+            </a:r>
+          </a:p>
+          <a:p>
+            <a:r>
+              <a:rPr lang="it-IT" sz="2400" dirty="0" err="1"/>
+              <a:t>Pandas</a:t>
+            </a:r>
+            <a:r>
+              <a:rPr lang="it-IT" sz="2400" dirty="0"/>
+              <a:t> e </a:t>
+            </a:r>
+            <a:r>
+              <a:rPr lang="it-IT" sz="2400" dirty="0" err="1"/>
+              <a:t>Numpy</a:t>
+            </a:r>
+            <a:r>
+              <a:rPr lang="it-IT" sz="2400" dirty="0"/>
+              <a:t>: librerie per l’analisi dati e il calcolo</a:t>
+            </a:r>
+          </a:p>
+          <a:p>
+            <a:r>
+              <a:rPr lang="it-IT" sz="2400" dirty="0" err="1"/>
+              <a:t>Matplotlib</a:t>
+            </a:r>
+            <a:r>
+              <a:rPr lang="it-IT" sz="2400" dirty="0"/>
+              <a:t>: libreria per creare grafici</a:t>
+            </a:r>
+          </a:p>
+          <a:p>
+            <a:r>
+              <a:rPr lang="it-IT" sz="2400" dirty="0" err="1"/>
+              <a:t>Jupyter</a:t>
+            </a:r>
+            <a:r>
+              <a:rPr lang="it-IT" sz="2400" dirty="0"/>
+              <a:t> Notebook: strumento per «tenere tutto insieme»</a:t>
             </a:r>
           </a:p>
         </p:txBody>
@@ -4591,6 +5044,386 @@
     <p:extLst>
       <p:ext uri="{BB962C8B-B14F-4D97-AF65-F5344CB8AC3E}">
         <p14:creationId xmlns:p14="http://schemas.microsoft.com/office/powerpoint/2010/main" val="3466574611"/>
+      </p:ext>
+    </p:extLst>
+  </p:cSld>
+  <p:clrMapOvr>
+    <a:masterClrMapping/>
+  </p:clrMapOvr>
+</p:sld>
+</file>
+
+<file path=ppt/slides/slide5.xml><?xml version="1.0" encoding="utf-8"?>
+<p:sld xmlns:a="http://schemas.openxmlformats.org/drawingml/2006/main" xmlns:r="http://schemas.openxmlformats.org/officeDocument/2006/relationships" xmlns:p="http://schemas.openxmlformats.org/presentationml/2006/main">
+  <p:cSld>
+    <p:bg>
+      <p:bgPr>
+        <a:solidFill>
+          <a:schemeClr val="bg1"/>
+        </a:solidFill>
+        <a:effectLst/>
+      </p:bgPr>
+    </p:bg>
+    <p:spTree>
+      <p:nvGrpSpPr>
+        <p:cNvPr id="1" name=""/>
+        <p:cNvGrpSpPr/>
+        <p:nvPr/>
+      </p:nvGrpSpPr>
+      <p:grpSpPr>
+        <a:xfrm>
+          <a:off x="0" y="0"/>
+          <a:ext cx="0" cy="0"/>
+          <a:chOff x="0" y="0"/>
+          <a:chExt cx="0" cy="0"/>
+        </a:xfrm>
+      </p:grpSpPr>
+      <p:sp>
+        <p:nvSpPr>
+          <p:cNvPr id="58" name="Rectangle 57">
+            <a:extLst>
+              <a:ext uri="{FF2B5EF4-FFF2-40B4-BE49-F238E27FC236}">
+                <a16:creationId xmlns:a16="http://schemas.microsoft.com/office/drawing/2014/main" id="{74426AB7-D619-4515-962A-BC83909EC015}"/>
+              </a:ext>
+              <a:ext uri="{C183D7F6-B498-43B3-948B-1728B52AA6E4}">
+                <adec:decorative xmlns:adec="http://schemas.microsoft.com/office/drawing/2017/decorative" val="1"/>
+              </a:ext>
+            </a:extLst>
+          </p:cNvPr>
+          <p:cNvSpPr>
+            <a:spLocks noGrp="1" noRot="1" noChangeAspect="1" noMove="1" noResize="1" noEditPoints="1" noAdjustHandles="1" noChangeArrowheads="1" noChangeShapeType="1" noTextEdit="1"/>
+          </p:cNvSpPr>
+          <p:nvPr>
+            <p:extLst>
+              <p:ext uri="{386F3935-93C4-4BCD-93E2-E3B085C9AB24}">
+                <p16:designElem xmlns:p16="http://schemas.microsoft.com/office/powerpoint/2015/main" val="1"/>
+              </p:ext>
+            </p:extLst>
+          </p:nvPr>
+        </p:nvSpPr>
+        <p:spPr>
+          <a:xfrm>
+            <a:off x="0" y="0"/>
+            <a:ext cx="12192000" cy="6858000"/>
+          </a:xfrm>
+          <a:prstGeom prst="rect">
+            <a:avLst/>
+          </a:prstGeom>
+          <a:ln>
+            <a:noFill/>
+          </a:ln>
+        </p:spPr>
+        <p:style>
+          <a:lnRef idx="2">
+            <a:schemeClr val="accent1">
+              <a:shade val="50000"/>
+            </a:schemeClr>
+          </a:lnRef>
+          <a:fillRef idx="1">
+            <a:schemeClr val="accent1"/>
+          </a:fillRef>
+          <a:effectRef idx="0">
+            <a:schemeClr val="accent1"/>
+          </a:effectRef>
+          <a:fontRef idx="minor">
+            <a:schemeClr val="lt1"/>
+          </a:fontRef>
+        </p:style>
+        <p:txBody>
+          <a:bodyPr rtlCol="0" anchor="ctr"/>
+          <a:lstStyle/>
+          <a:p>
+            <a:pPr algn="ctr"/>
+            <a:endParaRPr lang="en-US"/>
+          </a:p>
+        </p:txBody>
+      </p:sp>
+      <p:sp>
+        <p:nvSpPr>
+          <p:cNvPr id="60" name="Rectangle 59">
+            <a:extLst>
+              <a:ext uri="{FF2B5EF4-FFF2-40B4-BE49-F238E27FC236}">
+                <a16:creationId xmlns:a16="http://schemas.microsoft.com/office/drawing/2014/main" id="{DE47DF98-723F-4AAC-ABCF-CACBC438F78F}"/>
+              </a:ext>
+              <a:ext uri="{C183D7F6-B498-43B3-948B-1728B52AA6E4}">
+                <adec:decorative xmlns:adec="http://schemas.microsoft.com/office/drawing/2017/decorative" val="1"/>
+              </a:ext>
+            </a:extLst>
+          </p:cNvPr>
+          <p:cNvSpPr>
+            <a:spLocks noGrp="1" noRot="1" noChangeAspect="1" noMove="1" noResize="1" noEditPoints="1" noAdjustHandles="1" noChangeArrowheads="1" noChangeShapeType="1" noTextEdit="1"/>
+          </p:cNvSpPr>
+          <p:nvPr>
+            <p:extLst>
+              <p:ext uri="{386F3935-93C4-4BCD-93E2-E3B085C9AB24}">
+                <p16:designElem xmlns:p16="http://schemas.microsoft.com/office/powerpoint/2015/main" val="1"/>
+              </p:ext>
+            </p:extLst>
+          </p:nvPr>
+        </p:nvSpPr>
+        <p:spPr>
+          <a:xfrm>
+            <a:off x="243840" y="256540"/>
+            <a:ext cx="11704320" cy="6365239"/>
+          </a:xfrm>
+          <a:prstGeom prst="rect">
+            <a:avLst/>
+          </a:prstGeom>
+          <a:solidFill>
+            <a:srgbClr val="FFFFFF"/>
+          </a:solidFill>
+          <a:ln w="12700">
+            <a:noFill/>
+          </a:ln>
+        </p:spPr>
+        <p:style>
+          <a:lnRef idx="2">
+            <a:schemeClr val="accent1">
+              <a:shade val="50000"/>
+            </a:schemeClr>
+          </a:lnRef>
+          <a:fillRef idx="1">
+            <a:schemeClr val="accent1"/>
+          </a:fillRef>
+          <a:effectRef idx="0">
+            <a:schemeClr val="accent1"/>
+          </a:effectRef>
+          <a:fontRef idx="minor">
+            <a:schemeClr val="lt1"/>
+          </a:fontRef>
+        </p:style>
+      </p:sp>
+      <p:cxnSp>
+        <p:nvCxnSpPr>
+          <p:cNvPr id="62" name="Straight Connector 61">
+            <a:extLst>
+              <a:ext uri="{FF2B5EF4-FFF2-40B4-BE49-F238E27FC236}">
+                <a16:creationId xmlns:a16="http://schemas.microsoft.com/office/drawing/2014/main" id="{EA29FC7C-9308-4FDE-8DCA-405668055B0F}"/>
+              </a:ext>
+              <a:ext uri="{C183D7F6-B498-43B3-948B-1728B52AA6E4}">
+                <adec:decorative xmlns:adec="http://schemas.microsoft.com/office/drawing/2017/decorative" val="1"/>
+              </a:ext>
+            </a:extLst>
+          </p:cNvPr>
+          <p:cNvCxnSpPr>
+            <a:cxnSpLocks noGrp="1" noRot="1" noChangeAspect="1" noMove="1" noResize="1" noEditPoints="1" noAdjustHandles="1" noChangeArrowheads="1" noChangeShapeType="1"/>
+          </p:cNvCxnSpPr>
+          <p:nvPr>
+            <p:extLst>
+              <p:ext uri="{386F3935-93C4-4BCD-93E2-E3B085C9AB24}">
+                <p16:designElem xmlns:p16="http://schemas.microsoft.com/office/powerpoint/2015/main" val="1"/>
+              </p:ext>
+            </p:extLst>
+          </p:nvPr>
+        </p:nvCxnSpPr>
+        <p:spPr>
+          <a:xfrm>
+            <a:off x="2895600" y="5768204"/>
+            <a:ext cx="6400800" cy="0"/>
+          </a:xfrm>
+          <a:prstGeom prst="line">
+            <a:avLst/>
+          </a:prstGeom>
+          <a:ln>
+            <a:solidFill>
+              <a:schemeClr val="accent1"/>
+            </a:solidFill>
+          </a:ln>
+        </p:spPr>
+        <p:style>
+          <a:lnRef idx="1">
+            <a:schemeClr val="accent1"/>
+          </a:lnRef>
+          <a:fillRef idx="0">
+            <a:schemeClr val="accent1"/>
+          </a:fillRef>
+          <a:effectRef idx="0">
+            <a:schemeClr val="accent1"/>
+          </a:effectRef>
+          <a:fontRef idx="minor">
+            <a:schemeClr val="tx1"/>
+          </a:fontRef>
+        </p:style>
+      </p:cxnSp>
+      <p:sp>
+        <p:nvSpPr>
+          <p:cNvPr id="4" name="Titolo 3">
+            <a:extLst>
+              <a:ext uri="{FF2B5EF4-FFF2-40B4-BE49-F238E27FC236}">
+                <a16:creationId xmlns:a16="http://schemas.microsoft.com/office/drawing/2014/main" id="{4D4B8C53-9907-9F44-8B18-02C2B7463E55}"/>
+              </a:ext>
+            </a:extLst>
+          </p:cNvPr>
+          <p:cNvSpPr>
+            <a:spLocks noGrp="1"/>
+          </p:cNvSpPr>
+          <p:nvPr>
+            <p:ph type="title"/>
+          </p:nvPr>
+        </p:nvSpPr>
+        <p:spPr>
+          <a:xfrm>
+            <a:off x="1109980" y="4277356"/>
+            <a:ext cx="9966960" cy="1560320"/>
+          </a:xfrm>
+        </p:spPr>
+        <p:txBody>
+          <a:bodyPr vert="horz" lIns="91440" tIns="45720" rIns="91440" bIns="45720" rtlCol="0" anchor="b">
+            <a:normAutofit/>
+          </a:bodyPr>
+          <a:lstStyle/>
+          <a:p>
+            <a:pPr algn="ctr"/>
+            <a:r>
+              <a:rPr lang="en-US" sz="2800" dirty="0" err="1">
+                <a:solidFill>
+                  <a:schemeClr val="accent1"/>
+                </a:solidFill>
+              </a:rPr>
+              <a:t>Esercizi</a:t>
+            </a:r>
+            <a:r>
+              <a:rPr lang="en-US" sz="2800" dirty="0">
+                <a:solidFill>
+                  <a:schemeClr val="accent1"/>
+                </a:solidFill>
+              </a:rPr>
+              <a:t> e dataset per </a:t>
+            </a:r>
+            <a:r>
+              <a:rPr lang="en-US" sz="2800" dirty="0" err="1">
+                <a:solidFill>
+                  <a:schemeClr val="accent1"/>
+                </a:solidFill>
+              </a:rPr>
+              <a:t>il</a:t>
+            </a:r>
+            <a:r>
+              <a:rPr lang="en-US" sz="2800" dirty="0">
+                <a:solidFill>
+                  <a:schemeClr val="accent1"/>
+                </a:solidFill>
+              </a:rPr>
+              <a:t> </a:t>
+            </a:r>
+            <a:r>
+              <a:rPr lang="en-US" sz="2800" dirty="0" err="1">
+                <a:solidFill>
+                  <a:schemeClr val="accent1"/>
+                </a:solidFill>
+              </a:rPr>
+              <a:t>laboratorio</a:t>
+            </a:r>
+            <a:r>
+              <a:rPr lang="en-US" sz="2800" dirty="0">
+                <a:solidFill>
+                  <a:schemeClr val="accent1"/>
+                </a:solidFill>
+              </a:rPr>
+              <a:t> li </a:t>
+            </a:r>
+            <a:r>
+              <a:rPr lang="en-US" sz="2800" dirty="0" err="1">
+                <a:solidFill>
+                  <a:schemeClr val="accent1"/>
+                </a:solidFill>
+              </a:rPr>
+              <a:t>trovate</a:t>
+            </a:r>
+            <a:r>
+              <a:rPr lang="en-US" sz="2800" dirty="0">
+                <a:solidFill>
+                  <a:schemeClr val="accent1"/>
+                </a:solidFill>
+              </a:rPr>
+              <a:t> qui:</a:t>
+            </a:r>
+          </a:p>
+        </p:txBody>
+      </p:sp>
+      <p:sp>
+        <p:nvSpPr>
+          <p:cNvPr id="9" name="Segnaposto contenuto 8">
+            <a:extLst>
+              <a:ext uri="{FF2B5EF4-FFF2-40B4-BE49-F238E27FC236}">
+                <a16:creationId xmlns:a16="http://schemas.microsoft.com/office/drawing/2014/main" id="{AFFBDDBD-B8E5-E340-8E62-B8814E2EDCCC}"/>
+              </a:ext>
+            </a:extLst>
+          </p:cNvPr>
+          <p:cNvSpPr>
+            <a:spLocks noGrp="1"/>
+          </p:cNvSpPr>
+          <p:nvPr>
+            <p:ph idx="1"/>
+          </p:nvPr>
+        </p:nvSpPr>
+        <p:spPr>
+          <a:xfrm>
+            <a:off x="1709530" y="5799489"/>
+            <a:ext cx="8767860" cy="440822"/>
+          </a:xfrm>
+        </p:spPr>
+        <p:txBody>
+          <a:bodyPr vert="horz" lIns="91440" tIns="45720" rIns="91440" bIns="45720" rtlCol="0">
+            <a:noAutofit/>
+          </a:bodyPr>
+          <a:lstStyle/>
+          <a:p>
+            <a:pPr marL="0" indent="0" algn="ctr">
+              <a:buNone/>
+            </a:pPr>
+            <a:r>
+              <a:rPr lang="en-US" sz="3200" b="1" dirty="0">
+                <a:solidFill>
+                  <a:schemeClr val="accent1"/>
+                </a:solidFill>
+                <a:latin typeface="+mj-lt"/>
+                <a:hlinkClick r:id="rId2"/>
+              </a:rPr>
+              <a:t>https://github.com/biancini/DataScience-HEP</a:t>
+            </a:r>
+            <a:endParaRPr lang="en-US" sz="3200" b="1" dirty="0">
+              <a:solidFill>
+                <a:schemeClr val="accent1"/>
+              </a:solidFill>
+              <a:latin typeface="+mj-lt"/>
+            </a:endParaRPr>
+          </a:p>
+        </p:txBody>
+      </p:sp>
+      <p:pic>
+        <p:nvPicPr>
+          <p:cNvPr id="5" name="Immagine 4">
+            <a:extLst>
+              <a:ext uri="{FF2B5EF4-FFF2-40B4-BE49-F238E27FC236}">
+                <a16:creationId xmlns:a16="http://schemas.microsoft.com/office/drawing/2014/main" id="{60114E3F-A640-2449-824C-D5F123564BFF}"/>
+              </a:ext>
+            </a:extLst>
+          </p:cNvPr>
+          <p:cNvPicPr>
+            <a:picLocks noChangeAspect="1"/>
+          </p:cNvPicPr>
+          <p:nvPr/>
+        </p:nvPicPr>
+        <p:blipFill rotWithShape="1">
+          <a:blip r:embed="rId3"/>
+          <a:srcRect t="24813" r="1" b="26824"/>
+          <a:stretch/>
+        </p:blipFill>
+        <p:spPr>
+          <a:xfrm>
+            <a:off x="243840" y="256540"/>
+            <a:ext cx="11704320" cy="3764276"/>
+          </a:xfrm>
+          <a:prstGeom prst="rect">
+            <a:avLst/>
+          </a:prstGeom>
+        </p:spPr>
+      </p:pic>
+    </p:spTree>
+    <p:extLst>
+      <p:ext uri="{BB962C8B-B14F-4D97-AF65-F5344CB8AC3E}">
+        <p14:creationId xmlns:p14="http://schemas.microsoft.com/office/powerpoint/2010/main" val="1300163380"/>
       </p:ext>
     </p:extLst>
   </p:cSld>

</xml_diff>